<commit_message>
updated slides for day3
</commit_message>
<xml_diff>
--- a/Slides/Day3_NLP_FakeNewsChallenge.pptx
+++ b/Slides/Day3_NLP_FakeNewsChallenge.pptx
@@ -5,7 +5,7 @@
     <p:sldMasterId id="2147483648" r:id="rId1"/>
   </p:sldMasterIdLst>
   <p:notesMasterIdLst>
-    <p:notesMasterId r:id="rId19"/>
+    <p:notesMasterId r:id="rId20"/>
   </p:notesMasterIdLst>
   <p:sldIdLst>
     <p:sldId id="256" r:id="rId2"/>
@@ -25,6 +25,7 @@
     <p:sldId id="275" r:id="rId16"/>
     <p:sldId id="276" r:id="rId17"/>
     <p:sldId id="278" r:id="rId18"/>
+    <p:sldId id="279" r:id="rId19"/>
   </p:sldIdLst>
   <p:sldSz cx="12192000" cy="6858000"/>
   <p:notesSz cx="6858000" cy="9144000"/>
@@ -213,7 +214,7 @@
           <a:p>
             <a:fld id="{31A8A4BD-1076-804C-96C9-61E51E7770A7}" type="datetimeFigureOut">
               <a:rPr lang="en-US" smtClean="0"/>
-              <a:t>7/13/18</a:t>
+              <a:t>7/25/18</a:t>
             </a:fld>
             <a:endParaRPr lang="en-US"/>
           </a:p>
@@ -1671,7 +1672,7 @@
           <a:p>
             <a:fld id="{C50CB83D-D45D-C944-BFF6-54245A66EDFC}" type="datetimeFigureOut">
               <a:rPr lang="en-US" smtClean="0"/>
-              <a:t>7/13/18</a:t>
+              <a:t>7/25/18</a:t>
             </a:fld>
             <a:endParaRPr lang="en-US"/>
           </a:p>
@@ -1869,7 +1870,7 @@
           <a:p>
             <a:fld id="{C50CB83D-D45D-C944-BFF6-54245A66EDFC}" type="datetimeFigureOut">
               <a:rPr lang="en-US" smtClean="0"/>
-              <a:t>7/13/18</a:t>
+              <a:t>7/25/18</a:t>
             </a:fld>
             <a:endParaRPr lang="en-US"/>
           </a:p>
@@ -2077,7 +2078,7 @@
           <a:p>
             <a:fld id="{C50CB83D-D45D-C944-BFF6-54245A66EDFC}" type="datetimeFigureOut">
               <a:rPr lang="en-US" smtClean="0"/>
-              <a:t>7/13/18</a:t>
+              <a:t>7/25/18</a:t>
             </a:fld>
             <a:endParaRPr lang="en-US"/>
           </a:p>
@@ -2275,7 +2276,7 @@
           <a:p>
             <a:fld id="{C50CB83D-D45D-C944-BFF6-54245A66EDFC}" type="datetimeFigureOut">
               <a:rPr lang="en-US" smtClean="0"/>
-              <a:t>7/13/18</a:t>
+              <a:t>7/25/18</a:t>
             </a:fld>
             <a:endParaRPr lang="en-US"/>
           </a:p>
@@ -2550,7 +2551,7 @@
           <a:p>
             <a:fld id="{C50CB83D-D45D-C944-BFF6-54245A66EDFC}" type="datetimeFigureOut">
               <a:rPr lang="en-US" smtClean="0"/>
-              <a:t>7/13/18</a:t>
+              <a:t>7/25/18</a:t>
             </a:fld>
             <a:endParaRPr lang="en-US"/>
           </a:p>
@@ -2815,7 +2816,7 @@
           <a:p>
             <a:fld id="{C50CB83D-D45D-C944-BFF6-54245A66EDFC}" type="datetimeFigureOut">
               <a:rPr lang="en-US" smtClean="0"/>
-              <a:t>7/13/18</a:t>
+              <a:t>7/25/18</a:t>
             </a:fld>
             <a:endParaRPr lang="en-US"/>
           </a:p>
@@ -3227,7 +3228,7 @@
           <a:p>
             <a:fld id="{C50CB83D-D45D-C944-BFF6-54245A66EDFC}" type="datetimeFigureOut">
               <a:rPr lang="en-US" smtClean="0"/>
-              <a:t>7/13/18</a:t>
+              <a:t>7/25/18</a:t>
             </a:fld>
             <a:endParaRPr lang="en-US"/>
           </a:p>
@@ -3368,7 +3369,7 @@
           <a:p>
             <a:fld id="{C50CB83D-D45D-C944-BFF6-54245A66EDFC}" type="datetimeFigureOut">
               <a:rPr lang="en-US" smtClean="0"/>
-              <a:t>7/13/18</a:t>
+              <a:t>7/25/18</a:t>
             </a:fld>
             <a:endParaRPr lang="en-US"/>
           </a:p>
@@ -3481,7 +3482,7 @@
           <a:p>
             <a:fld id="{C50CB83D-D45D-C944-BFF6-54245A66EDFC}" type="datetimeFigureOut">
               <a:rPr lang="en-US" smtClean="0"/>
-              <a:t>7/13/18</a:t>
+              <a:t>7/25/18</a:t>
             </a:fld>
             <a:endParaRPr lang="en-US"/>
           </a:p>
@@ -3792,7 +3793,7 @@
           <a:p>
             <a:fld id="{C50CB83D-D45D-C944-BFF6-54245A66EDFC}" type="datetimeFigureOut">
               <a:rPr lang="en-US" smtClean="0"/>
-              <a:t>7/13/18</a:t>
+              <a:t>7/25/18</a:t>
             </a:fld>
             <a:endParaRPr lang="en-US"/>
           </a:p>
@@ -4080,7 +4081,7 @@
           <a:p>
             <a:fld id="{C50CB83D-D45D-C944-BFF6-54245A66EDFC}" type="datetimeFigureOut">
               <a:rPr lang="en-US" smtClean="0"/>
-              <a:t>7/13/18</a:t>
+              <a:t>7/25/18</a:t>
             </a:fld>
             <a:endParaRPr lang="en-US"/>
           </a:p>
@@ -4321,7 +4322,7 @@
           <a:p>
             <a:fld id="{C50CB83D-D45D-C944-BFF6-54245A66EDFC}" type="datetimeFigureOut">
               <a:rPr lang="en-US" smtClean="0"/>
-              <a:t>7/13/18</a:t>
+              <a:t>7/25/18</a:t>
             </a:fld>
             <a:endParaRPr lang="en-US"/>
           </a:p>
@@ -5758,6 +5759,132 @@
     <p:extLst>
       <p:ext uri="{BB962C8B-B14F-4D97-AF65-F5344CB8AC3E}">
         <p14:creationId xmlns:p14="http://schemas.microsoft.com/office/powerpoint/2010/main" val="203052168"/>
+      </p:ext>
+    </p:extLst>
+  </p:cSld>
+  <p:clrMapOvr>
+    <a:masterClrMapping/>
+  </p:clrMapOvr>
+</p:sld>
+</file>
+
+<file path=ppt/slides/slide18.xml><?xml version="1.0" encoding="utf-8"?>
+<p:sld xmlns:a="http://schemas.openxmlformats.org/drawingml/2006/main" xmlns:r="http://schemas.openxmlformats.org/officeDocument/2006/relationships" xmlns:p="http://schemas.openxmlformats.org/presentationml/2006/main">
+  <p:cSld>
+    <p:spTree>
+      <p:nvGrpSpPr>
+        <p:cNvPr id="1" name=""/>
+        <p:cNvGrpSpPr/>
+        <p:nvPr/>
+      </p:nvGrpSpPr>
+      <p:grpSpPr>
+        <a:xfrm>
+          <a:off x="0" y="0"/>
+          <a:ext cx="0" cy="0"/>
+          <a:chOff x="0" y="0"/>
+          <a:chExt cx="0" cy="0"/>
+        </a:xfrm>
+      </p:grpSpPr>
+      <p:sp>
+        <p:nvSpPr>
+          <p:cNvPr id="3" name="Content Placeholder 2">
+            <a:extLst>
+              <a:ext uri="{FF2B5EF4-FFF2-40B4-BE49-F238E27FC236}">
+                <a16:creationId xmlns:a16="http://schemas.microsoft.com/office/drawing/2014/main" id="{16A6291C-3882-AB48-9966-4E2557B67CCD}"/>
+              </a:ext>
+            </a:extLst>
+          </p:cNvPr>
+          <p:cNvSpPr>
+            <a:spLocks noGrp="1"/>
+          </p:cNvSpPr>
+          <p:nvPr>
+            <p:ph idx="1"/>
+          </p:nvPr>
+        </p:nvSpPr>
+        <p:spPr>
+          <a:xfrm>
+            <a:off x="838200" y="700088"/>
+            <a:ext cx="10515600" cy="5476875"/>
+          </a:xfrm>
+        </p:spPr>
+        <p:txBody>
+          <a:bodyPr/>
+          <a:lstStyle/>
+          <a:p>
+            <a:pPr marL="0" indent="0">
+              <a:buNone/>
+            </a:pPr>
+            <a:r>
+              <a:rPr lang="en-US" dirty="0"/>
+              <a:t>Materials for today:</a:t>
+            </a:r>
+          </a:p>
+          <a:p>
+            <a:pPr marL="0" indent="0">
+              <a:buNone/>
+            </a:pPr>
+            <a:r>
+              <a:rPr lang="en-US" dirty="0">
+                <a:hlinkClick r:id="rId2"/>
+              </a:rPr>
+              <a:t>https://github.com/cchen23/AI4ALL_NLP_student</a:t>
+            </a:r>
+            <a:endParaRPr lang="en-US" dirty="0"/>
+          </a:p>
+          <a:p>
+            <a:pPr>
+              <a:buFontTx/>
+              <a:buChar char="-"/>
+            </a:pPr>
+            <a:r>
+              <a:rPr lang="en-US" dirty="0"/>
+              <a:t>Download the zip file for today (2018_07_25)</a:t>
+            </a:r>
+          </a:p>
+          <a:p>
+            <a:pPr marL="0" indent="0">
+              <a:buNone/>
+            </a:pPr>
+            <a:endParaRPr lang="en-US" dirty="0"/>
+          </a:p>
+          <a:p>
+            <a:pPr marL="0" indent="0">
+              <a:buNone/>
+            </a:pPr>
+            <a:r>
+              <a:rPr lang="en-US" dirty="0"/>
+              <a:t>We are going to use the dataset we created yesterday (</a:t>
+            </a:r>
+            <a:r>
+              <a:rPr lang="en-US" dirty="0" err="1"/>
+              <a:t>train_data.csv</a:t>
+            </a:r>
+            <a:r>
+              <a:rPr lang="en-US" dirty="0"/>
+              <a:t>), but there will be an opportunity to recreate it if you can’t find it, or didn’t complete yesterday’s notebook.  </a:t>
+            </a:r>
+          </a:p>
+          <a:p>
+            <a:pPr marL="0" indent="0">
+              <a:buNone/>
+            </a:pPr>
+            <a:endParaRPr lang="en-US" dirty="0"/>
+          </a:p>
+          <a:p>
+            <a:pPr marL="0" indent="0">
+              <a:buNone/>
+            </a:pPr>
+            <a:r>
+              <a:rPr lang="en-US" dirty="0"/>
+              <a:t>Let us know if you have problems.</a:t>
+            </a:r>
+          </a:p>
+        </p:txBody>
+      </p:sp>
+    </p:spTree>
+    <p:extLst>
+      <p:ext uri="{BB962C8B-B14F-4D97-AF65-F5344CB8AC3E}">
+        <p14:creationId xmlns:p14="http://schemas.microsoft.com/office/powerpoint/2010/main" val="1595025273"/>
       </p:ext>
     </p:extLst>
   </p:cSld>

</xml_diff>